<commit_message>
Minor changes to hw07
</commit_message>
<xml_diff>
--- a/ece-18-642/lec-05-to-09/hw07/HW07_NGUYEN_Todd_noid.pptx
+++ b/ece-18-642/lec-05-to-09/hw07/HW07_NGUYEN_Todd_noid.pptx
@@ -219,7 +219,7 @@
           <a:p>
             <a:fld id="{5F56AD2F-80F8-473C-8960-33F411928B05}" type="datetimeFigureOut">
               <a:rPr lang="en-US" smtClean="0"/>
-              <a:t>2021-03-15</a:t>
+              <a:t>2021-03-16</a:t>
             </a:fld>
             <a:endParaRPr lang="en-US"/>
           </a:p>
@@ -618,7 +618,7 @@
           <a:p>
             <a:fld id="{A2B525AD-4D7B-435F-88EF-BA23B8CFD0DE}" type="datetime1">
               <a:rPr lang="en-US" smtClean="0"/>
-              <a:t>2021-03-15</a:t>
+              <a:t>2021-03-16</a:t>
             </a:fld>
             <a:endParaRPr lang="en-US"/>
           </a:p>
@@ -792,7 +792,7 @@
           <a:p>
             <a:fld id="{5BDD93E8-0689-4935-B953-28B88CF30C86}" type="datetime1">
               <a:rPr lang="en-US" smtClean="0"/>
-              <a:t>2021-03-15</a:t>
+              <a:t>2021-03-16</a:t>
             </a:fld>
             <a:endParaRPr lang="en-US"/>
           </a:p>
@@ -976,7 +976,7 @@
           <a:p>
             <a:fld id="{C34A1DF9-2580-4A62-B358-2070818CFD0C}" type="datetime1">
               <a:rPr lang="en-US" smtClean="0"/>
-              <a:t>2021-03-15</a:t>
+              <a:t>2021-03-16</a:t>
             </a:fld>
             <a:endParaRPr lang="en-US"/>
           </a:p>
@@ -1150,7 +1150,7 @@
           <a:p>
             <a:fld id="{5C41F0A4-DD27-4FF4-AFD6-68C6A84CE21F}" type="datetime1">
               <a:rPr lang="en-US" smtClean="0"/>
-              <a:t>2021-03-15</a:t>
+              <a:t>2021-03-16</a:t>
             </a:fld>
             <a:endParaRPr lang="en-US"/>
           </a:p>
@@ -1400,7 +1400,7 @@
           <a:p>
             <a:fld id="{3B6078B8-B091-4E00-849F-C93E890A9403}" type="datetime1">
               <a:rPr lang="en-US" smtClean="0"/>
-              <a:t>2021-03-15</a:t>
+              <a:t>2021-03-16</a:t>
             </a:fld>
             <a:endParaRPr lang="en-US"/>
           </a:p>
@@ -1636,7 +1636,7 @@
           <a:p>
             <a:fld id="{E884E5CD-91A8-4F1C-BAB9-4A9D2AD4CFA2}" type="datetime1">
               <a:rPr lang="en-US" smtClean="0"/>
-              <a:t>2021-03-15</a:t>
+              <a:t>2021-03-16</a:t>
             </a:fld>
             <a:endParaRPr lang="en-US"/>
           </a:p>
@@ -2007,7 +2007,7 @@
           <a:p>
             <a:fld id="{5CB9805C-3726-44C6-8D0F-D38EC169A09F}" type="datetime1">
               <a:rPr lang="en-US" smtClean="0"/>
-              <a:t>2021-03-15</a:t>
+              <a:t>2021-03-16</a:t>
             </a:fld>
             <a:endParaRPr lang="en-US"/>
           </a:p>
@@ -2129,7 +2129,7 @@
           <a:p>
             <a:fld id="{9E5FEB25-8FC6-4B44-AE8C-1710A2410F6A}" type="datetime1">
               <a:rPr lang="en-US" smtClean="0"/>
-              <a:t>2021-03-15</a:t>
+              <a:t>2021-03-16</a:t>
             </a:fld>
             <a:endParaRPr lang="en-US"/>
           </a:p>
@@ -2228,7 +2228,7 @@
           <a:p>
             <a:fld id="{4DE1F663-EFFA-418D-BF5A-74FC6D11CDE9}" type="datetime1">
               <a:rPr lang="en-US" smtClean="0"/>
-              <a:t>2021-03-15</a:t>
+              <a:t>2021-03-16</a:t>
             </a:fld>
             <a:endParaRPr lang="en-US"/>
           </a:p>
@@ -2509,7 +2509,7 @@
           <a:p>
             <a:fld id="{0D924D71-7721-4619-9B99-91B3935720CB}" type="datetime1">
               <a:rPr lang="en-US" smtClean="0"/>
-              <a:t>2021-03-15</a:t>
+              <a:t>2021-03-16</a:t>
             </a:fld>
             <a:endParaRPr lang="en-US"/>
           </a:p>
@@ -2770,7 +2770,7 @@
           <a:p>
             <a:fld id="{F9175935-D2BD-4321-8125-5EEFB2939DD9}" type="datetime1">
               <a:rPr lang="en-US" smtClean="0"/>
-              <a:t>2021-03-15</a:t>
+              <a:t>2021-03-16</a:t>
             </a:fld>
             <a:endParaRPr lang="en-US"/>
           </a:p>
@@ -2987,7 +2987,7 @@
           <a:p>
             <a:fld id="{29D6871A-DDDD-4DEC-A09C-C98B47207C3D}" type="datetime1">
               <a:rPr lang="en-US" smtClean="0"/>
-              <a:t>2021-03-15</a:t>
+              <a:t>2021-03-16</a:t>
             </a:fld>
             <a:endParaRPr lang="en-US"/>
           </a:p>
@@ -3619,7 +3619,11 @@
           <a:p>
             <a:r>
               <a:rPr lang="en-US" dirty="0" smtClean="0"/>
-              <a:t>The turtle shall report its Orientation and if it detected a wall at each tick using </a:t>
+              <a:t>R3. The </a:t>
+            </a:r>
+            <a:r>
+              <a:rPr lang="en-US" dirty="0" smtClean="0"/>
+              <a:t>turtle shall report its Orientation and if it detected a wall at each tick using </a:t>
             </a:r>
             <a:r>
               <a:rPr lang="en-US" dirty="0" smtClean="0">
@@ -3635,7 +3639,11 @@
           <a:p>
             <a:r>
               <a:rPr lang="en-US" dirty="0" smtClean="0"/>
-              <a:t>The turtle shall move by setting its x/y coordinates to a new coordinate.</a:t>
+              <a:t>R4. The </a:t>
+            </a:r>
+            <a:r>
+              <a:rPr lang="en-US" dirty="0" smtClean="0"/>
+              <a:t>turtle shall move by setting its x/y coordinates to a new coordinate.</a:t>
             </a:r>
           </a:p>
           <a:p>

</xml_diff>